<commit_message>
Renamed slides in the order of presentation
</commit_message>
<xml_diff>
--- a/DesignSession/Azure DevDay – Whiteboard Design Session.pptx
+++ b/DesignSession/Azure DevDay – Whiteboard Design Session.pptx
@@ -215,7 +215,7 @@
           <a:p>
             <a:fld id="{DBDDAED8-0708-4003-8271-82287D7F428C}" type="datetimeFigureOut">
               <a:rPr lang="en-US" smtClean="0"/>
-              <a:t>12/5/2018</a:t>
+              <a:t>1/22/2019</a:t>
             </a:fld>
             <a:endParaRPr lang="en-US"/>
           </a:p>
@@ -604,7 +604,7 @@
           <a:p>
             <a:fld id="{386CE63F-9E7F-4C04-9D0D-FCA25A8E9E86}" type="datetime8">
               <a:rPr lang="en-US" smtClean="0"/>
-              <a:t>12/5/2018 1:58 PM</a:t>
+              <a:t>1/22/2019 10:09 AM</a:t>
             </a:fld>
             <a:endParaRPr lang="en-US"/>
           </a:p>
@@ -868,7 +868,7 @@
                 <a:tabLst/>
                 <a:defRPr/>
               </a:pPr>
-              <a:t>12/5/2018 1:58 PM</a:t>
+              <a:t>1/22/2019 10:09 AM</a:t>
             </a:fld>
             <a:endParaRPr kumimoji="0" lang="en-US" sz="1200" b="0" i="0" u="none" strike="noStrike" kern="1200" cap="none" spc="0" normalizeH="0" baseline="0" noProof="0" dirty="0">
               <a:ln>
@@ -1214,7 +1214,7 @@
           <a:p>
             <a:fld id="{AC1490E7-1871-46B7-B3E9-09661F334C53}" type="datetimeFigureOut">
               <a:rPr lang="en-US" smtClean="0"/>
-              <a:t>12/5/2018</a:t>
+              <a:t>1/22/2019</a:t>
             </a:fld>
             <a:endParaRPr lang="en-US"/>
           </a:p>
@@ -1412,7 +1412,7 @@
           <a:p>
             <a:fld id="{AC1490E7-1871-46B7-B3E9-09661F334C53}" type="datetimeFigureOut">
               <a:rPr lang="en-US" smtClean="0"/>
-              <a:t>12/5/2018</a:t>
+              <a:t>1/22/2019</a:t>
             </a:fld>
             <a:endParaRPr lang="en-US"/>
           </a:p>
@@ -1620,7 +1620,7 @@
           <a:p>
             <a:fld id="{AC1490E7-1871-46B7-B3E9-09661F334C53}" type="datetimeFigureOut">
               <a:rPr lang="en-US" smtClean="0"/>
-              <a:t>12/5/2018</a:t>
+              <a:t>1/22/2019</a:t>
             </a:fld>
             <a:endParaRPr lang="en-US"/>
           </a:p>
@@ -3599,7 +3599,7 @@
           <a:p>
             <a:fld id="{AC1490E7-1871-46B7-B3E9-09661F334C53}" type="datetimeFigureOut">
               <a:rPr lang="en-US" smtClean="0"/>
-              <a:t>12/5/2018</a:t>
+              <a:t>1/22/2019</a:t>
             </a:fld>
             <a:endParaRPr lang="en-US"/>
           </a:p>
@@ -5409,7 +5409,7 @@
           <a:p>
             <a:fld id="{AC1490E7-1871-46B7-B3E9-09661F334C53}" type="datetimeFigureOut">
               <a:rPr lang="en-US" smtClean="0"/>
-              <a:t>12/5/2018</a:t>
+              <a:t>1/22/2019</a:t>
             </a:fld>
             <a:endParaRPr lang="en-US"/>
           </a:p>
@@ -5674,7 +5674,7 @@
           <a:p>
             <a:fld id="{AC1490E7-1871-46B7-B3E9-09661F334C53}" type="datetimeFigureOut">
               <a:rPr lang="en-US" smtClean="0"/>
-              <a:t>12/5/2018</a:t>
+              <a:t>1/22/2019</a:t>
             </a:fld>
             <a:endParaRPr lang="en-US"/>
           </a:p>
@@ -6086,7 +6086,7 @@
           <a:p>
             <a:fld id="{AC1490E7-1871-46B7-B3E9-09661F334C53}" type="datetimeFigureOut">
               <a:rPr lang="en-US" smtClean="0"/>
-              <a:t>12/5/2018</a:t>
+              <a:t>1/22/2019</a:t>
             </a:fld>
             <a:endParaRPr lang="en-US"/>
           </a:p>
@@ -6227,7 +6227,7 @@
           <a:p>
             <a:fld id="{AC1490E7-1871-46B7-B3E9-09661F334C53}" type="datetimeFigureOut">
               <a:rPr lang="en-US" smtClean="0"/>
-              <a:t>12/5/2018</a:t>
+              <a:t>1/22/2019</a:t>
             </a:fld>
             <a:endParaRPr lang="en-US"/>
           </a:p>
@@ -6340,7 +6340,7 @@
           <a:p>
             <a:fld id="{AC1490E7-1871-46B7-B3E9-09661F334C53}" type="datetimeFigureOut">
               <a:rPr lang="en-US" smtClean="0"/>
-              <a:t>12/5/2018</a:t>
+              <a:t>1/22/2019</a:t>
             </a:fld>
             <a:endParaRPr lang="en-US"/>
           </a:p>
@@ -6651,7 +6651,7 @@
           <a:p>
             <a:fld id="{AC1490E7-1871-46B7-B3E9-09661F334C53}" type="datetimeFigureOut">
               <a:rPr lang="en-US" smtClean="0"/>
-              <a:t>12/5/2018</a:t>
+              <a:t>1/22/2019</a:t>
             </a:fld>
             <a:endParaRPr lang="en-US"/>
           </a:p>
@@ -6939,7 +6939,7 @@
           <a:p>
             <a:fld id="{AC1490E7-1871-46B7-B3E9-09661F334C53}" type="datetimeFigureOut">
               <a:rPr lang="en-US" smtClean="0"/>
-              <a:t>12/5/2018</a:t>
+              <a:t>1/22/2019</a:t>
             </a:fld>
             <a:endParaRPr lang="en-US"/>
           </a:p>
@@ -7180,7 +7180,7 @@
           <a:p>
             <a:fld id="{AC1490E7-1871-46B7-B3E9-09661F334C53}" type="datetimeFigureOut">
               <a:rPr lang="en-US" smtClean="0"/>
-              <a:t>12/5/2018</a:t>
+              <a:t>1/22/2019</a:t>
             </a:fld>
             <a:endParaRPr lang="en-US"/>
           </a:p>
@@ -8513,7 +8513,7 @@
                   <a:schemeClr val="bg1"/>
                 </a:solidFill>
               </a:rPr>
-              <a:t>omahadevdays</a:t>
+              <a:t>phldevdays</a:t>
             </a:r>
             <a:endParaRPr lang="en-US" sz="2400" dirty="0">
               <a:solidFill>
@@ -8554,78 +8554,6 @@
           </a:p>
         </p:txBody>
       </p:sp>
-      <p:pic>
-        <p:nvPicPr>
-          <p:cNvPr id="6" name="Picture 5" descr="A close up of a sign&#10;&#10;Description automatically generated">
-            <a:extLst>
-              <a:ext uri="{FF2B5EF4-FFF2-40B4-BE49-F238E27FC236}">
-                <a16:creationId xmlns:a16="http://schemas.microsoft.com/office/drawing/2014/main" id="{4269E982-04B7-4C1B-8995-F8F6ACCA1FBF}"/>
-              </a:ext>
-            </a:extLst>
-          </p:cNvPr>
-          <p:cNvPicPr>
-            <a:picLocks noChangeAspect="1"/>
-          </p:cNvPicPr>
-          <p:nvPr/>
-        </p:nvPicPr>
-        <p:blipFill>
-          <a:blip r:embed="rId3">
-            <a:extLst>
-              <a:ext uri="{28A0092B-C50C-407E-A947-70E740481C1C}">
-                <a14:useLocalDpi xmlns:a14="http://schemas.microsoft.com/office/drawing/2010/main" val="0"/>
-              </a:ext>
-            </a:extLst>
-          </a:blip>
-          <a:stretch>
-            <a:fillRect/>
-          </a:stretch>
-        </p:blipFill>
-        <p:spPr>
-          <a:xfrm>
-            <a:off x="279563" y="5706662"/>
-            <a:ext cx="3142946" cy="817166"/>
-          </a:xfrm>
-          <a:prstGeom prst="rect">
-            <a:avLst/>
-          </a:prstGeom>
-        </p:spPr>
-      </p:pic>
-      <p:pic>
-        <p:nvPicPr>
-          <p:cNvPr id="8" name="Picture 7" descr="A picture containing clipart&#10;&#10;Description automatically generated">
-            <a:extLst>
-              <a:ext uri="{FF2B5EF4-FFF2-40B4-BE49-F238E27FC236}">
-                <a16:creationId xmlns:a16="http://schemas.microsoft.com/office/drawing/2014/main" id="{7B1CC001-C942-4E74-8259-AE0FC1412011}"/>
-              </a:ext>
-            </a:extLst>
-          </p:cNvPr>
-          <p:cNvPicPr>
-            <a:picLocks noChangeAspect="1"/>
-          </p:cNvPicPr>
-          <p:nvPr/>
-        </p:nvPicPr>
-        <p:blipFill>
-          <a:blip r:embed="rId4">
-            <a:extLst>
-              <a:ext uri="{28A0092B-C50C-407E-A947-70E740481C1C}">
-                <a14:useLocalDpi xmlns:a14="http://schemas.microsoft.com/office/drawing/2010/main" val="0"/>
-              </a:ext>
-            </a:extLst>
-          </a:blip>
-          <a:stretch>
-            <a:fillRect/>
-          </a:stretch>
-        </p:blipFill>
-        <p:spPr>
-          <a:xfrm>
-            <a:off x="1049589" y="4789000"/>
-            <a:ext cx="1872384" cy="895693"/>
-          </a:xfrm>
-          <a:prstGeom prst="rect">
-            <a:avLst/>
-          </a:prstGeom>
-        </p:spPr>
-      </p:pic>
     </p:spTree>
     <p:extLst>
       <p:ext uri="{BB962C8B-B14F-4D97-AF65-F5344CB8AC3E}">
@@ -12102,12 +12030,9 @@
 </file>
 
 <file path=customXml/item1.xml><?xml version="1.0" encoding="utf-8"?>
-<?mso-contentType ?>
-<FormTemplates xmlns="http://schemas.microsoft.com/sharepoint/v3/contenttype/forms">
-  <Display>DocumentLibraryForm</Display>
-  <Edit>DocumentLibraryForm</Edit>
-  <New>DocumentLibraryForm</New>
-</FormTemplates>
+<p:properties xmlns:p="http://schemas.microsoft.com/office/2006/metadata/properties" xmlns:xsi="http://www.w3.org/2001/XMLSchema-instance" xmlns:pc="http://schemas.microsoft.com/office/infopath/2007/PartnerControls">
+  <documentManagement/>
+</p:properties>
 </file>
 
 <file path=customXml/item2.xml><?xml version="1.0" encoding="utf-8"?>
@@ -12261,15 +12186,26 @@
 </file>
 
 <file path=customXml/item3.xml><?xml version="1.0" encoding="utf-8"?>
-<p:properties xmlns:p="http://schemas.microsoft.com/office/2006/metadata/properties" xmlns:xsi="http://www.w3.org/2001/XMLSchema-instance" xmlns:pc="http://schemas.microsoft.com/office/infopath/2007/PartnerControls">
-  <documentManagement/>
-</p:properties>
+<?mso-contentType ?>
+<FormTemplates xmlns="http://schemas.microsoft.com/sharepoint/v3/contenttype/forms">
+  <Display>DocumentLibraryForm</Display>
+  <Edit>DocumentLibraryForm</Edit>
+  <New>DocumentLibraryForm</New>
+</FormTemplates>
 </file>
 
 <file path=customXml/itemProps1.xml><?xml version="1.0" encoding="utf-8"?>
-<ds:datastoreItem xmlns:ds="http://schemas.openxmlformats.org/officeDocument/2006/customXml" ds:itemID="{C7ED26B3-1852-4382-93C0-9E66BE1A2289}">
+<ds:datastoreItem xmlns:ds="http://schemas.openxmlformats.org/officeDocument/2006/customXml" ds:itemID="{18A72D78-ED71-4D78-B376-C7DF0E32C162}">
   <ds:schemaRefs>
-    <ds:schemaRef ds:uri="http://schemas.microsoft.com/sharepoint/v3/contenttype/forms"/>
+    <ds:schemaRef ds:uri="http://schemas.openxmlformats.org/package/2006/metadata/core-properties"/>
+    <ds:schemaRef ds:uri="fac12304-a514-4bf9-8a9b-59948ddf2c1c"/>
+    <ds:schemaRef ds:uri="http://schemas.microsoft.com/office/2006/documentManagement/types"/>
+    <ds:schemaRef ds:uri="http://schemas.microsoft.com/office/infopath/2007/PartnerControls"/>
+    <ds:schemaRef ds:uri="http://purl.org/dc/elements/1.1/"/>
+    <ds:schemaRef ds:uri="http://schemas.microsoft.com/office/2006/metadata/properties"/>
+    <ds:schemaRef ds:uri="http://purl.org/dc/terms/"/>
+    <ds:schemaRef ds:uri="http://www.w3.org/XML/1998/namespace"/>
+    <ds:schemaRef ds:uri="http://purl.org/dc/dcmitype/"/>
   </ds:schemaRefs>
 </ds:datastoreItem>
 </file>
@@ -12293,17 +12229,9 @@
 </file>
 
 <file path=customXml/itemProps3.xml><?xml version="1.0" encoding="utf-8"?>
-<ds:datastoreItem xmlns:ds="http://schemas.openxmlformats.org/officeDocument/2006/customXml" ds:itemID="{18A72D78-ED71-4D78-B376-C7DF0E32C162}">
+<ds:datastoreItem xmlns:ds="http://schemas.openxmlformats.org/officeDocument/2006/customXml" ds:itemID="{C7ED26B3-1852-4382-93C0-9E66BE1A2289}">
   <ds:schemaRefs>
-    <ds:schemaRef ds:uri="http://schemas.openxmlformats.org/package/2006/metadata/core-properties"/>
-    <ds:schemaRef ds:uri="fac12304-a514-4bf9-8a9b-59948ddf2c1c"/>
-    <ds:schemaRef ds:uri="http://schemas.microsoft.com/office/2006/documentManagement/types"/>
-    <ds:schemaRef ds:uri="http://schemas.microsoft.com/office/infopath/2007/PartnerControls"/>
-    <ds:schemaRef ds:uri="http://purl.org/dc/elements/1.1/"/>
-    <ds:schemaRef ds:uri="http://schemas.microsoft.com/office/2006/metadata/properties"/>
-    <ds:schemaRef ds:uri="http://purl.org/dc/terms/"/>
-    <ds:schemaRef ds:uri="http://www.w3.org/XML/1998/namespace"/>
-    <ds:schemaRef ds:uri="http://purl.org/dc/dcmitype/"/>
+    <ds:schemaRef ds:uri="http://schemas.microsoft.com/sharepoint/v3/contenttype/forms"/>
   </ds:schemaRefs>
 </ds:datastoreItem>
 </file>
</xml_diff>